<commit_message>
Fix errors in NPCC
</commit_message>
<xml_diff>
--- a/nercmap/citymap.pptx
+++ b/nercmap/citymap.pptx
@@ -263,7 +263,7 @@
           <a:p>
             <a:fld id="{4F9E8FCA-B87D-D642-AB84-528D41178B7E}" type="datetimeFigureOut">
               <a:rPr lang="en-US" smtClean="0"/>
-              <a:t>6/22/19</a:t>
+              <a:t>6/26/19</a:t>
             </a:fld>
             <a:endParaRPr lang="en-US"/>
           </a:p>
@@ -461,7 +461,7 @@
           <a:p>
             <a:fld id="{4F9E8FCA-B87D-D642-AB84-528D41178B7E}" type="datetimeFigureOut">
               <a:rPr lang="en-US" smtClean="0"/>
-              <a:t>6/22/19</a:t>
+              <a:t>6/26/19</a:t>
             </a:fld>
             <a:endParaRPr lang="en-US"/>
           </a:p>
@@ -669,7 +669,7 @@
           <a:p>
             <a:fld id="{4F9E8FCA-B87D-D642-AB84-528D41178B7E}" type="datetimeFigureOut">
               <a:rPr lang="en-US" smtClean="0"/>
-              <a:t>6/22/19</a:t>
+              <a:t>6/26/19</a:t>
             </a:fld>
             <a:endParaRPr lang="en-US"/>
           </a:p>
@@ -867,7 +867,7 @@
           <a:p>
             <a:fld id="{4F9E8FCA-B87D-D642-AB84-528D41178B7E}" type="datetimeFigureOut">
               <a:rPr lang="en-US" smtClean="0"/>
-              <a:t>6/22/19</a:t>
+              <a:t>6/26/19</a:t>
             </a:fld>
             <a:endParaRPr lang="en-US"/>
           </a:p>
@@ -1142,7 +1142,7 @@
           <a:p>
             <a:fld id="{4F9E8FCA-B87D-D642-AB84-528D41178B7E}" type="datetimeFigureOut">
               <a:rPr lang="en-US" smtClean="0"/>
-              <a:t>6/22/19</a:t>
+              <a:t>6/26/19</a:t>
             </a:fld>
             <a:endParaRPr lang="en-US"/>
           </a:p>
@@ -1407,7 +1407,7 @@
           <a:p>
             <a:fld id="{4F9E8FCA-B87D-D642-AB84-528D41178B7E}" type="datetimeFigureOut">
               <a:rPr lang="en-US" smtClean="0"/>
-              <a:t>6/22/19</a:t>
+              <a:t>6/26/19</a:t>
             </a:fld>
             <a:endParaRPr lang="en-US"/>
           </a:p>
@@ -1819,7 +1819,7 @@
           <a:p>
             <a:fld id="{4F9E8FCA-B87D-D642-AB84-528D41178B7E}" type="datetimeFigureOut">
               <a:rPr lang="en-US" smtClean="0"/>
-              <a:t>6/22/19</a:t>
+              <a:t>6/26/19</a:t>
             </a:fld>
             <a:endParaRPr lang="en-US"/>
           </a:p>
@@ -1960,7 +1960,7 @@
           <a:p>
             <a:fld id="{4F9E8FCA-B87D-D642-AB84-528D41178B7E}" type="datetimeFigureOut">
               <a:rPr lang="en-US" smtClean="0"/>
-              <a:t>6/22/19</a:t>
+              <a:t>6/26/19</a:t>
             </a:fld>
             <a:endParaRPr lang="en-US"/>
           </a:p>
@@ -2073,7 +2073,7 @@
           <a:p>
             <a:fld id="{4F9E8FCA-B87D-D642-AB84-528D41178B7E}" type="datetimeFigureOut">
               <a:rPr lang="en-US" smtClean="0"/>
-              <a:t>6/22/19</a:t>
+              <a:t>6/26/19</a:t>
             </a:fld>
             <a:endParaRPr lang="en-US"/>
           </a:p>
@@ -2384,7 +2384,7 @@
           <a:p>
             <a:fld id="{4F9E8FCA-B87D-D642-AB84-528D41178B7E}" type="datetimeFigureOut">
               <a:rPr lang="en-US" smtClean="0"/>
-              <a:t>6/22/19</a:t>
+              <a:t>6/26/19</a:t>
             </a:fld>
             <a:endParaRPr lang="en-US"/>
           </a:p>
@@ -2672,7 +2672,7 @@
           <a:p>
             <a:fld id="{4F9E8FCA-B87D-D642-AB84-528D41178B7E}" type="datetimeFigureOut">
               <a:rPr lang="en-US" smtClean="0"/>
-              <a:t>6/22/19</a:t>
+              <a:t>6/26/19</a:t>
             </a:fld>
             <a:endParaRPr lang="en-US"/>
           </a:p>
@@ -2913,7 +2913,7 @@
           <a:p>
             <a:fld id="{4F9E8FCA-B87D-D642-AB84-528D41178B7E}" type="datetimeFigureOut">
               <a:rPr lang="en-US" smtClean="0"/>
-              <a:t>6/22/19</a:t>
+              <a:t>6/26/19</a:t>
             </a:fld>
             <a:endParaRPr lang="en-US"/>
           </a:p>
@@ -7349,7 +7349,7 @@
                   <a:schemeClr val="tx1"/>
                 </a:solidFill>
               </a:rPr>
-              <a:t>ITH</a:t>
+              <a:t>SYR</a:t>
             </a:r>
           </a:p>
         </p:txBody>
@@ -8276,6 +8276,65 @@
           </a:p>
         </p:txBody>
       </p:sp>
+      <p:sp>
+        <p:nvSpPr>
+          <p:cNvPr id="100" name="Oval 99">
+            <a:extLst>
+              <a:ext uri="{FF2B5EF4-FFF2-40B4-BE49-F238E27FC236}">
+                <a16:creationId xmlns:a16="http://schemas.microsoft.com/office/drawing/2014/main" id="{C71D52B9-79BA-6645-8C18-8B2C2B17FA89}"/>
+              </a:ext>
+            </a:extLst>
+          </p:cNvPr>
+          <p:cNvSpPr/>
+          <p:nvPr/>
+        </p:nvSpPr>
+        <p:spPr>
+          <a:xfrm>
+            <a:off x="8391837" y="2457767"/>
+            <a:ext cx="90237" cy="90238"/>
+          </a:xfrm>
+          <a:prstGeom prst="ellipse">
+            <a:avLst/>
+          </a:prstGeom>
+          <a:solidFill>
+            <a:srgbClr val="92D050"/>
+          </a:solidFill>
+          <a:ln>
+            <a:noFill/>
+          </a:ln>
+        </p:spPr>
+        <p:style>
+          <a:lnRef idx="2">
+            <a:schemeClr val="dk1">
+              <a:shade val="50000"/>
+            </a:schemeClr>
+          </a:lnRef>
+          <a:fillRef idx="1">
+            <a:schemeClr val="dk1"/>
+          </a:fillRef>
+          <a:effectRef idx="0">
+            <a:schemeClr val="dk1"/>
+          </a:effectRef>
+          <a:fontRef idx="minor">
+            <a:schemeClr val="lt1"/>
+          </a:fontRef>
+        </p:style>
+        <p:txBody>
+          <a:bodyPr wrap="none" rtlCol="0" anchor="b" anchorCtr="0"/>
+          <a:lstStyle/>
+          <a:p>
+            <a:pPr algn="r" fontAlgn="ctr"/>
+            <a:r>
+              <a:rPr lang="en-US" sz="1050" dirty="0">
+                <a:solidFill>
+                  <a:schemeClr val="tx1"/>
+                </a:solidFill>
+              </a:rPr>
+              <a:t>YYZ</a:t>
+            </a:r>
+          </a:p>
+        </p:txBody>
+      </p:sp>
     </p:spTree>
     <p:extLst>
       <p:ext uri="{BB962C8B-B14F-4D97-AF65-F5344CB8AC3E}">
@@ -12374,7 +12433,7 @@
                     <a:schemeClr val="tx1"/>
                   </a:solidFill>
                 </a:rPr>
-                <a:t>ITH</a:t>
+                <a:t>SYR</a:t>
               </a:r>
             </a:p>
           </p:txBody>
@@ -14122,6 +14181,65 @@
           </a:p>
         </p:txBody>
       </p:sp>
+      <p:sp>
+        <p:nvSpPr>
+          <p:cNvPr id="103" name="Oval 102">
+            <a:extLst>
+              <a:ext uri="{FF2B5EF4-FFF2-40B4-BE49-F238E27FC236}">
+                <a16:creationId xmlns:a16="http://schemas.microsoft.com/office/drawing/2014/main" id="{5016204B-A2DB-F741-92E6-BBAB40BEF0F1}"/>
+              </a:ext>
+            </a:extLst>
+          </p:cNvPr>
+          <p:cNvSpPr/>
+          <p:nvPr/>
+        </p:nvSpPr>
+        <p:spPr>
+          <a:xfrm>
+            <a:off x="6198216" y="4884940"/>
+            <a:ext cx="180529" cy="180531"/>
+          </a:xfrm>
+          <a:prstGeom prst="ellipse">
+            <a:avLst/>
+          </a:prstGeom>
+          <a:solidFill>
+            <a:srgbClr val="92D050"/>
+          </a:solidFill>
+          <a:ln>
+            <a:noFill/>
+          </a:ln>
+        </p:spPr>
+        <p:style>
+          <a:lnRef idx="2">
+            <a:schemeClr val="dk1">
+              <a:shade val="50000"/>
+            </a:schemeClr>
+          </a:lnRef>
+          <a:fillRef idx="1">
+            <a:schemeClr val="dk1"/>
+          </a:fillRef>
+          <a:effectRef idx="0">
+            <a:schemeClr val="dk1"/>
+          </a:effectRef>
+          <a:fontRef idx="minor">
+            <a:schemeClr val="lt1"/>
+          </a:fontRef>
+        </p:style>
+        <p:txBody>
+          <a:bodyPr wrap="none" rtlCol="0" anchor="b" anchorCtr="0"/>
+          <a:lstStyle/>
+          <a:p>
+            <a:pPr algn="r" fontAlgn="ctr"/>
+            <a:r>
+              <a:rPr lang="en-US" sz="1050" dirty="0">
+                <a:solidFill>
+                  <a:schemeClr val="tx1"/>
+                </a:solidFill>
+              </a:rPr>
+              <a:t>YYZ</a:t>
+            </a:r>
+          </a:p>
+        </p:txBody>
+      </p:sp>
     </p:spTree>
     <p:extLst>
       <p:ext uri="{BB962C8B-B14F-4D97-AF65-F5344CB8AC3E}">
@@ -18220,7 +18338,7 @@
                     <a:schemeClr val="tx1"/>
                   </a:solidFill>
                 </a:rPr>
-                <a:t>ITH</a:t>
+                <a:t>SYR</a:t>
               </a:r>
             </a:p>
           </p:txBody>
@@ -18734,6 +18852,65 @@
           </a:prstGeom>
         </p:spPr>
       </p:pic>
+      <p:sp>
+        <p:nvSpPr>
+          <p:cNvPr id="93" name="Oval 92">
+            <a:extLst>
+              <a:ext uri="{FF2B5EF4-FFF2-40B4-BE49-F238E27FC236}">
+                <a16:creationId xmlns:a16="http://schemas.microsoft.com/office/drawing/2014/main" id="{D0CF5247-EFB3-3949-BD32-DAF797C2B46B}"/>
+              </a:ext>
+            </a:extLst>
+          </p:cNvPr>
+          <p:cNvSpPr/>
+          <p:nvPr/>
+        </p:nvSpPr>
+        <p:spPr>
+          <a:xfrm>
+            <a:off x="7365482" y="1682396"/>
+            <a:ext cx="267119" cy="267122"/>
+          </a:xfrm>
+          <a:prstGeom prst="ellipse">
+            <a:avLst/>
+          </a:prstGeom>
+          <a:solidFill>
+            <a:srgbClr val="92D050"/>
+          </a:solidFill>
+          <a:ln>
+            <a:noFill/>
+          </a:ln>
+        </p:spPr>
+        <p:style>
+          <a:lnRef idx="2">
+            <a:schemeClr val="dk1">
+              <a:shade val="50000"/>
+            </a:schemeClr>
+          </a:lnRef>
+          <a:fillRef idx="1">
+            <a:schemeClr val="dk1"/>
+          </a:fillRef>
+          <a:effectRef idx="0">
+            <a:schemeClr val="dk1"/>
+          </a:effectRef>
+          <a:fontRef idx="minor">
+            <a:schemeClr val="lt1"/>
+          </a:fontRef>
+        </p:style>
+        <p:txBody>
+          <a:bodyPr wrap="none" rtlCol="0" anchor="t" anchorCtr="0"/>
+          <a:lstStyle/>
+          <a:p>
+            <a:pPr fontAlgn="ctr"/>
+            <a:r>
+              <a:rPr lang="en-US" sz="1050" dirty="0">
+                <a:solidFill>
+                  <a:schemeClr val="tx1"/>
+                </a:solidFill>
+              </a:rPr>
+              <a:t>YYZ</a:t>
+            </a:r>
+          </a:p>
+        </p:txBody>
+      </p:sp>
     </p:spTree>
     <p:extLst>
       <p:ext uri="{BB962C8B-B14F-4D97-AF65-F5344CB8AC3E}">
@@ -28381,7 +28558,7 @@
                     <a:schemeClr val="tx1"/>
                   </a:solidFill>
                 </a:rPr>
-                <a:t>ITH</a:t>
+                <a:t>SYR</a:t>
               </a:r>
             </a:p>
           </p:txBody>
@@ -29190,6 +29367,65 @@
           </a:p>
         </p:txBody>
       </p:sp>
+      <p:sp>
+        <p:nvSpPr>
+          <p:cNvPr id="98" name="Oval 97">
+            <a:extLst>
+              <a:ext uri="{FF2B5EF4-FFF2-40B4-BE49-F238E27FC236}">
+                <a16:creationId xmlns:a16="http://schemas.microsoft.com/office/drawing/2014/main" id="{08B0A4C0-8121-954A-BA96-7E51BD74B098}"/>
+              </a:ext>
+            </a:extLst>
+          </p:cNvPr>
+          <p:cNvSpPr/>
+          <p:nvPr/>
+        </p:nvSpPr>
+        <p:spPr>
+          <a:xfrm>
+            <a:off x="11282230" y="2514159"/>
+            <a:ext cx="124836" cy="124838"/>
+          </a:xfrm>
+          <a:prstGeom prst="ellipse">
+            <a:avLst/>
+          </a:prstGeom>
+          <a:solidFill>
+            <a:srgbClr val="92D050"/>
+          </a:solidFill>
+          <a:ln>
+            <a:noFill/>
+          </a:ln>
+        </p:spPr>
+        <p:style>
+          <a:lnRef idx="2">
+            <a:schemeClr val="dk1">
+              <a:shade val="50000"/>
+            </a:schemeClr>
+          </a:lnRef>
+          <a:fillRef idx="1">
+            <a:schemeClr val="dk1"/>
+          </a:fillRef>
+          <a:effectRef idx="0">
+            <a:schemeClr val="dk1"/>
+          </a:effectRef>
+          <a:fontRef idx="minor">
+            <a:schemeClr val="lt1"/>
+          </a:fontRef>
+        </p:style>
+        <p:txBody>
+          <a:bodyPr wrap="none" rtlCol="0" anchor="b" anchorCtr="0"/>
+          <a:lstStyle/>
+          <a:p>
+            <a:pPr algn="r" fontAlgn="ctr"/>
+            <a:r>
+              <a:rPr lang="en-US" sz="1050" dirty="0">
+                <a:solidFill>
+                  <a:schemeClr val="tx1"/>
+                </a:solidFill>
+              </a:rPr>
+              <a:t>YYZ</a:t>
+            </a:r>
+          </a:p>
+        </p:txBody>
+      </p:sp>
     </p:spTree>
     <p:extLst>
       <p:ext uri="{BB962C8B-B14F-4D97-AF65-F5344CB8AC3E}">

</xml_diff>